<commit_message>
add experiments for present: lr=0.003
</commit_message>
<xml_diff>
--- a/week7/Dissertation_7.pptx
+++ b/week7/Dissertation_7.pptx
@@ -11,10 +11,10 @@
     <p:sldId id="260" r:id="rId2"/>
     <p:sldId id="273" r:id="rId3"/>
     <p:sldId id="298" r:id="rId4"/>
-    <p:sldId id="297" r:id="rId5"/>
+    <p:sldId id="299" r:id="rId5"/>
     <p:sldId id="282" r:id="rId6"/>
-    <p:sldId id="290" r:id="rId7"/>
-    <p:sldId id="293" r:id="rId8"/>
+    <p:sldId id="300" r:id="rId7"/>
+    <p:sldId id="290" r:id="rId8"/>
     <p:sldId id="296" r:id="rId9"/>
   </p:sldIdLst>
   <p:sldSz cx="12192000" cy="6858000"/>
@@ -204,7 +204,7 @@
           <a:p>
             <a:fld id="{5551B73A-00A5-41F0-AD1E-E8BC06CD57C4}" type="datetimeFigureOut">
               <a:rPr lang="zh-CN" altLang="en-US" smtClean="0"/>
-              <a:t>2023/7/15</a:t>
+              <a:t>2023/7/17</a:t>
             </a:fld>
             <a:endParaRPr lang="zh-CN" altLang="en-US"/>
           </a:p>
@@ -4061,7 +4061,7 @@
           <a:p>
             <a:r>
               <a:rPr lang="en-US" dirty="0"/>
-              <a:t>Week6. </a:t>
+              <a:t>Week7. </a:t>
             </a:r>
             <a:br>
               <a:rPr lang="en-US" dirty="0"/>
@@ -5217,14 +5217,24 @@
           </a:xfrm>
         </p:spPr>
         <p:txBody>
-          <a:bodyPr/>
-          <a:lstStyle/>
-          <a:p>
-            <a:r>
-              <a:rPr lang="en-US" altLang="zh-CN" dirty="0"/>
-              <a:t>Transfer learning Approaches</a:t>
-            </a:r>
-            <a:endParaRPr lang="zh-CN" altLang="en-US" dirty="0"/>
+          <a:bodyPr>
+            <a:normAutofit/>
+          </a:bodyPr>
+          <a:lstStyle/>
+          <a:p>
+            <a:r>
+              <a:rPr lang="en-US" altLang="zh-CN" sz="4000" dirty="0">
+                <a:solidFill>
+                  <a:srgbClr val="0070C0"/>
+                </a:solidFill>
+              </a:rPr>
+              <a:t>Implemented method</a:t>
+            </a:r>
+            <a:endParaRPr lang="zh-CN" altLang="en-US" sz="4000" dirty="0">
+              <a:solidFill>
+                <a:srgbClr val="0070C0"/>
+              </a:solidFill>
+            </a:endParaRPr>
           </a:p>
         </p:txBody>
       </p:sp>
@@ -5259,10 +5269,73 @@
       </p:sp>
       <p:sp>
         <p:nvSpPr>
-          <p:cNvPr id="5" name="文本框 4">
-            <a:extLst>
-              <a:ext uri="{FF2B5EF4-FFF2-40B4-BE49-F238E27FC236}">
-                <a16:creationId xmlns:a16="http://schemas.microsoft.com/office/drawing/2014/main" id="{845637AD-D55C-9023-2235-DDE9EB1FBEE5}"/>
+          <p:cNvPr id="10" name="标题 1">
+            <a:extLst>
+              <a:ext uri="{FF2B5EF4-FFF2-40B4-BE49-F238E27FC236}">
+                <a16:creationId xmlns:a16="http://schemas.microsoft.com/office/drawing/2014/main" id="{32BD7E6F-57EE-527C-D007-8552B4454662}"/>
+              </a:ext>
+            </a:extLst>
+          </p:cNvPr>
+          <p:cNvSpPr txBox="1">
+            <a:spLocks/>
+          </p:cNvSpPr>
+          <p:nvPr/>
+        </p:nvSpPr>
+        <p:spPr>
+          <a:xfrm>
+            <a:off x="239333" y="494824"/>
+            <a:ext cx="10515600" cy="1325563"/>
+          </a:xfrm>
+          <a:prstGeom prst="rect">
+            <a:avLst/>
+          </a:prstGeom>
+        </p:spPr>
+        <p:txBody>
+          <a:bodyPr vert="horz" lIns="91440" tIns="45720" rIns="91440" bIns="45720" rtlCol="0" anchor="ctr">
+            <a:normAutofit/>
+          </a:bodyPr>
+          <a:lstStyle>
+            <a:lvl1pPr algn="l" defTabSz="914400" rtl="0" eaLnBrk="1" latinLnBrk="0" hangingPunct="1">
+              <a:lnSpc>
+                <a:spcPct val="90000"/>
+              </a:lnSpc>
+              <a:spcBef>
+                <a:spcPct val="0"/>
+              </a:spcBef>
+              <a:buNone/>
+              <a:defRPr sz="4400" kern="1200">
+                <a:solidFill>
+                  <a:schemeClr val="tx1"/>
+                </a:solidFill>
+                <a:latin typeface="+mj-lt"/>
+                <a:ea typeface="+mj-ea"/>
+                <a:cs typeface="+mj-cs"/>
+              </a:defRPr>
+            </a:lvl1pPr>
+          </a:lstStyle>
+          <a:p>
+            <a:r>
+              <a:rPr lang="en-US" altLang="zh-CN" sz="2000" dirty="0">
+                <a:solidFill>
+                  <a:srgbClr val="0070C0"/>
+                </a:solidFill>
+              </a:rPr>
+              <a:t>Have a look on the influence of time feature</a:t>
+            </a:r>
+            <a:endParaRPr lang="zh-CN" altLang="en-US" sz="2000" dirty="0">
+              <a:solidFill>
+                <a:srgbClr val="0070C0"/>
+              </a:solidFill>
+            </a:endParaRPr>
+          </a:p>
+        </p:txBody>
+      </p:sp>
+      <p:sp>
+        <p:nvSpPr>
+          <p:cNvPr id="7" name="文本框 6">
+            <a:extLst>
+              <a:ext uri="{FF2B5EF4-FFF2-40B4-BE49-F238E27FC236}">
+                <a16:creationId xmlns:a16="http://schemas.microsoft.com/office/drawing/2014/main" id="{AC18719D-E1C4-77FE-0FDB-9D5E044FED8B}"/>
               </a:ext>
             </a:extLst>
           </p:cNvPr>
@@ -5271,8 +5344,8 @@
         </p:nvSpPr>
         <p:spPr>
           <a:xfrm>
-            <a:off x="382641" y="1198364"/>
-            <a:ext cx="9241156" cy="6186309"/>
+            <a:off x="239333" y="1392942"/>
+            <a:ext cx="6096964" cy="4401205"/>
           </a:xfrm>
           <a:prstGeom prst="rect">
             <a:avLst/>
@@ -5287,118 +5360,38 @@
           <a:p>
             <a:pPr algn="l"/>
             <a:r>
-              <a:rPr lang="en-GB" altLang="zh-CN" sz="3600" b="0" i="0" dirty="0">
-                <a:solidFill>
-                  <a:schemeClr val="accent1"/>
-                </a:solidFill>
-                <a:effectLst/>
+              <a:rPr lang="en-US" altLang="zh-CN" sz="2000" dirty="0">
+                <a:solidFill>
+                  <a:srgbClr val="1F2328"/>
+                </a:solidFill>
                 <a:latin typeface="Calibri" panose="020F0502020204030204" pitchFamily="34" charset="0"/>
                 <a:ea typeface="Calibri" panose="020F0502020204030204" pitchFamily="34" charset="0"/>
                 <a:cs typeface="Calibri" panose="020F0502020204030204" pitchFamily="34" charset="0"/>
               </a:rPr>
-              <a:t>1. Fine Tuning (1e-5 </a:t>
-            </a:r>
-            <a:r>
-              <a:rPr lang="en-GB" altLang="zh-CN" sz="3600" b="0" i="0" dirty="0" err="1">
-                <a:solidFill>
-                  <a:schemeClr val="accent1"/>
-                </a:solidFill>
-                <a:effectLst/>
+              <a:t>One derived value from each action:</a:t>
+            </a:r>
+          </a:p>
+          <a:p>
+            <a:pPr marL="342900" indent="-342900" algn="l">
+              <a:buAutoNum type="arabicPeriod"/>
+            </a:pPr>
+            <a:r>
+              <a:rPr lang="en-US" altLang="zh-CN" sz="2000" dirty="0">
+                <a:solidFill>
+                  <a:srgbClr val="1F2328"/>
+                </a:solidFill>
                 <a:latin typeface="Calibri" panose="020F0502020204030204" pitchFamily="34" charset="0"/>
                 <a:ea typeface="Calibri" panose="020F0502020204030204" pitchFamily="34" charset="0"/>
                 <a:cs typeface="Calibri" panose="020F0502020204030204" pitchFamily="34" charset="0"/>
               </a:rPr>
-              <a:t>lr</a:t>
-            </a:r>
-            <a:r>
-              <a:rPr lang="en-GB" altLang="zh-CN" sz="3600" b="0" i="0" dirty="0">
-                <a:solidFill>
-                  <a:schemeClr val="accent1"/>
-                </a:solidFill>
-                <a:effectLst/>
-                <a:latin typeface="Calibri" panose="020F0502020204030204" pitchFamily="34" charset="0"/>
-                <a:ea typeface="Calibri" panose="020F0502020204030204" pitchFamily="34" charset="0"/>
-                <a:cs typeface="Calibri" panose="020F0502020204030204" pitchFamily="34" charset="0"/>
-              </a:rPr>
-              <a:t> on item embeddings)</a:t>
-            </a:r>
-          </a:p>
-          <a:p>
-            <a:pPr algn="l"/>
-            <a:endParaRPr lang="en-GB" altLang="zh-CN" sz="3600" b="0" i="0" dirty="0">
-              <a:solidFill>
-                <a:schemeClr val="accent1"/>
-              </a:solidFill>
-              <a:effectLst/>
-              <a:latin typeface="Calibri" panose="020F0502020204030204" pitchFamily="34" charset="0"/>
-              <a:ea typeface="Calibri" panose="020F0502020204030204" pitchFamily="34" charset="0"/>
-              <a:cs typeface="Calibri" panose="020F0502020204030204" pitchFamily="34" charset="0"/>
-            </a:endParaRPr>
-          </a:p>
-          <a:p>
-            <a:pPr algn="l"/>
-            <a:r>
-              <a:rPr lang="en-GB" altLang="zh-CN" sz="3600" b="0" i="0" dirty="0">
-                <a:solidFill>
-                  <a:schemeClr val="accent1"/>
-                </a:solidFill>
-                <a:effectLst/>
-                <a:latin typeface="Calibri" panose="020F0502020204030204" pitchFamily="34" charset="0"/>
-                <a:ea typeface="Calibri" panose="020F0502020204030204" pitchFamily="34" charset="0"/>
-                <a:cs typeface="Calibri" panose="020F0502020204030204" pitchFamily="34" charset="0"/>
-              </a:rPr>
-              <a:t>2. Freeze the item embeddings</a:t>
-            </a:r>
-          </a:p>
-          <a:p>
-            <a:pPr algn="l"/>
-            <a:endParaRPr lang="en-GB" altLang="zh-CN" sz="3600" b="0" i="0" dirty="0">
-              <a:solidFill>
-                <a:schemeClr val="accent1"/>
-              </a:solidFill>
-              <a:effectLst/>
-              <a:latin typeface="Calibri" panose="020F0502020204030204" pitchFamily="34" charset="0"/>
-              <a:ea typeface="Calibri" panose="020F0502020204030204" pitchFamily="34" charset="0"/>
-              <a:cs typeface="Calibri" panose="020F0502020204030204" pitchFamily="34" charset="0"/>
-            </a:endParaRPr>
-          </a:p>
-          <a:p>
-            <a:pPr algn="l"/>
-            <a:r>
-              <a:rPr lang="en-GB" altLang="zh-CN" sz="3600" b="0" i="0" dirty="0">
-                <a:effectLst/>
-                <a:latin typeface="Calibri" panose="020F0502020204030204" pitchFamily="34" charset="0"/>
-                <a:ea typeface="Calibri" panose="020F0502020204030204" pitchFamily="34" charset="0"/>
-                <a:cs typeface="Calibri" panose="020F0502020204030204" pitchFamily="34" charset="0"/>
-              </a:rPr>
-              <a:t>Item embedding</a:t>
-            </a:r>
-          </a:p>
-          <a:p>
-            <a:pPr algn="l"/>
-            <a:r>
-              <a:rPr lang="en-US" altLang="zh-CN" sz="2400" dirty="0">
-                <a:solidFill>
-                  <a:srgbClr val="1F2328"/>
-                </a:solidFill>
-                <a:latin typeface="Calibri" panose="020F0502020204030204" pitchFamily="34" charset="0"/>
-                <a:ea typeface="Calibri" panose="020F0502020204030204" pitchFamily="34" charset="0"/>
-                <a:cs typeface="Calibri" panose="020F0502020204030204" pitchFamily="34" charset="0"/>
-              </a:rPr>
-              <a:t>Trained on the normal </a:t>
-            </a:r>
-            <a:r>
-              <a:rPr lang="en-US" altLang="zh-CN" sz="2400" dirty="0" err="1">
-                <a:solidFill>
-                  <a:srgbClr val="1F2328"/>
-                </a:solidFill>
-                <a:latin typeface="Calibri" panose="020F0502020204030204" pitchFamily="34" charset="0"/>
-                <a:ea typeface="Calibri" panose="020F0502020204030204" pitchFamily="34" charset="0"/>
-                <a:cs typeface="Calibri" panose="020F0502020204030204" pitchFamily="34" charset="0"/>
-              </a:rPr>
-              <a:t>sasrec</a:t>
-            </a:r>
-            <a:endParaRPr lang="en-US" altLang="zh-CN" sz="2400" dirty="0">
+              <a:t>The difference between the latest timestamp in the sequence and an action’s timestamp. (absolute time stamp)</a:t>
+            </a:r>
+          </a:p>
+          <a:p>
+            <a:pPr marL="342900" indent="-342900" algn="l">
+              <a:buAutoNum type="arabicPeriod"/>
+            </a:pPr>
+            <a:endParaRPr lang="en-US" altLang="zh-CN" sz="2000" dirty="0">
               <a:solidFill>
                 <a:srgbClr val="1F2328"/>
               </a:solidFill>
@@ -5408,10 +5401,60 @@
             </a:endParaRPr>
           </a:p>
           <a:p>
-            <a:pPr marL="342900" indent="-342900" algn="l">
+            <a:pPr algn="l"/>
+            <a:r>
+              <a:rPr lang="en-US" altLang="zh-CN" sz="2000" dirty="0">
+                <a:solidFill>
+                  <a:srgbClr val="1F2328"/>
+                </a:solidFill>
+                <a:latin typeface="Calibri" panose="020F0502020204030204" pitchFamily="34" charset="0"/>
+                <a:ea typeface="Calibri" panose="020F0502020204030204" pitchFamily="34" charset="0"/>
+                <a:cs typeface="Calibri" panose="020F0502020204030204" pitchFamily="34" charset="0"/>
+              </a:rPr>
+              <a:t>For each value:</a:t>
+            </a:r>
+          </a:p>
+          <a:p>
+            <a:pPr marL="457200" indent="-457200" algn="l">
               <a:buAutoNum type="arabicPeriod"/>
             </a:pPr>
-            <a:endParaRPr lang="en-US" altLang="zh-CN" sz="2400" dirty="0">
+            <a:r>
+              <a:rPr lang="en-US" altLang="zh-CN" sz="2000" dirty="0">
+                <a:solidFill>
+                  <a:srgbClr val="1F2328"/>
+                </a:solidFill>
+                <a:latin typeface="Calibri" panose="020F0502020204030204" pitchFamily="34" charset="0"/>
+                <a:ea typeface="Calibri" panose="020F0502020204030204" pitchFamily="34" charset="0"/>
+                <a:cs typeface="Calibri" panose="020F0502020204030204" pitchFamily="34" charset="0"/>
+              </a:rPr>
+              <a:t>Periodic Activation:</a:t>
+            </a:r>
+            <a:r>
+              <a:rPr lang="zh-CN" altLang="en-US" sz="2000" dirty="0">
+                <a:solidFill>
+                  <a:srgbClr val="1F2328"/>
+                </a:solidFill>
+                <a:latin typeface="Calibri" panose="020F0502020204030204" pitchFamily="34" charset="0"/>
+                <a:ea typeface="Calibri" panose="020F0502020204030204" pitchFamily="34" charset="0"/>
+                <a:cs typeface="Calibri" panose="020F0502020204030204" pitchFamily="34" charset="0"/>
+              </a:rPr>
+              <a:t> </a:t>
+            </a:r>
+            <a:r>
+              <a:rPr lang="en-US" altLang="zh-CN" sz="2000" dirty="0">
+                <a:solidFill>
+                  <a:srgbClr val="1F2328"/>
+                </a:solidFill>
+                <a:latin typeface="Calibri" panose="020F0502020204030204" pitchFamily="34" charset="0"/>
+                <a:ea typeface="Calibri" panose="020F0502020204030204" pitchFamily="34" charset="0"/>
+                <a:cs typeface="Calibri" panose="020F0502020204030204" pitchFamily="34" charset="0"/>
+              </a:rPr>
+              <a:t>cos (P dims)</a:t>
+            </a:r>
+          </a:p>
+          <a:p>
+            <a:pPr algn="l"/>
+            <a:endParaRPr lang="en-US" altLang="zh-CN" sz="2000" dirty="0">
               <a:solidFill>
                 <a:srgbClr val="1F2328"/>
               </a:solidFill>
@@ -5422,40 +5465,7 @@
           </a:p>
           <a:p>
             <a:pPr algn="l"/>
-            <a:r>
-              <a:rPr lang="en-GB" altLang="zh-CN" sz="3600" dirty="0">
-                <a:latin typeface="Calibri" panose="020F0502020204030204" pitchFamily="34" charset="0"/>
-                <a:ea typeface="Calibri" panose="020F0502020204030204" pitchFamily="34" charset="0"/>
-                <a:cs typeface="Calibri" panose="020F0502020204030204" pitchFamily="34" charset="0"/>
-              </a:rPr>
-              <a:t>Other parameters</a:t>
-            </a:r>
-            <a:endParaRPr lang="en-GB" altLang="zh-CN" sz="3600" b="0" i="0" dirty="0">
-              <a:effectLst/>
-              <a:latin typeface="Calibri" panose="020F0502020204030204" pitchFamily="34" charset="0"/>
-              <a:ea typeface="Calibri" panose="020F0502020204030204" pitchFamily="34" charset="0"/>
-              <a:cs typeface="Calibri" panose="020F0502020204030204" pitchFamily="34" charset="0"/>
-            </a:endParaRPr>
-          </a:p>
-          <a:p>
-            <a:pPr algn="l"/>
-            <a:r>
-              <a:rPr lang="en-US" altLang="zh-CN" sz="2400" dirty="0">
-                <a:solidFill>
-                  <a:srgbClr val="1F2328"/>
-                </a:solidFill>
-                <a:latin typeface="Calibri" panose="020F0502020204030204" pitchFamily="34" charset="0"/>
-                <a:ea typeface="Calibri" panose="020F0502020204030204" pitchFamily="34" charset="0"/>
-                <a:cs typeface="Calibri" panose="020F0502020204030204" pitchFamily="34" charset="0"/>
-              </a:rPr>
-              <a:t>Train from different training objectives</a:t>
-            </a:r>
-          </a:p>
-          <a:p>
-            <a:pPr marL="342900" indent="-342900" algn="l">
-              <a:buAutoNum type="arabicPeriod"/>
-            </a:pPr>
-            <a:endParaRPr lang="en-US" altLang="zh-CN" sz="1800" dirty="0">
+            <a:endParaRPr lang="en-US" altLang="zh-CN" sz="2000" dirty="0">
               <a:solidFill>
                 <a:srgbClr val="1F2328"/>
               </a:solidFill>
@@ -5465,10 +5475,8 @@
             </a:endParaRPr>
           </a:p>
           <a:p>
-            <a:pPr marL="342900" indent="-342900" algn="l">
-              <a:buAutoNum type="arabicPeriod"/>
-            </a:pPr>
-            <a:endParaRPr lang="en-US" altLang="zh-CN" sz="1800" dirty="0">
+            <a:pPr algn="l"/>
+            <a:endParaRPr lang="en-US" altLang="zh-CN" sz="2000" dirty="0">
               <a:solidFill>
                 <a:srgbClr val="1F2328"/>
               </a:solidFill>
@@ -5478,10 +5486,8 @@
             </a:endParaRPr>
           </a:p>
           <a:p>
-            <a:pPr marL="342900" indent="-342900" algn="l">
-              <a:buAutoNum type="arabicPeriod"/>
-            </a:pPr>
-            <a:endParaRPr lang="en-US" altLang="zh-CN" sz="1800" dirty="0">
+            <a:pPr algn="l"/>
+            <a:endParaRPr lang="en-US" altLang="zh-CN" sz="2000" dirty="0">
               <a:solidFill>
                 <a:srgbClr val="1F2328"/>
               </a:solidFill>
@@ -5492,7 +5498,35 @@
           </a:p>
           <a:p>
             <a:pPr algn="l"/>
-            <a:endParaRPr lang="en-GB" altLang="zh-CN" dirty="0">
+            <a:r>
+              <a:rPr lang="en-US" altLang="zh-CN" sz="2000" dirty="0">
+                <a:solidFill>
+                  <a:srgbClr val="1F2328"/>
+                </a:solidFill>
+                <a:latin typeface="Calibri" panose="020F0502020204030204" pitchFamily="34" charset="0"/>
+                <a:ea typeface="Calibri" panose="020F0502020204030204" pitchFamily="34" charset="0"/>
+                <a:cs typeface="Calibri" panose="020F0502020204030204" pitchFamily="34" charset="0"/>
+              </a:rPr>
+              <a:t>This generate P features for value.</a:t>
+            </a:r>
+          </a:p>
+          <a:p>
+            <a:pPr algn="l"/>
+            <a:r>
+              <a:rPr lang="en-US" altLang="zh-CN" sz="2000" dirty="0">
+                <a:solidFill>
+                  <a:srgbClr val="1F2328"/>
+                </a:solidFill>
+                <a:latin typeface="Calibri" panose="020F0502020204030204" pitchFamily="34" charset="0"/>
+                <a:ea typeface="Calibri" panose="020F0502020204030204" pitchFamily="34" charset="0"/>
+                <a:cs typeface="Calibri" panose="020F0502020204030204" pitchFamily="34" charset="0"/>
+              </a:rPr>
+              <a:t>Increase 2P parameters (P frequency and P phase-shift)</a:t>
+            </a:r>
+          </a:p>
+          <a:p>
+            <a:pPr algn="l"/>
+            <a:endParaRPr lang="en-US" altLang="zh-CN" sz="2000" dirty="0">
               <a:solidFill>
                 <a:srgbClr val="1F2328"/>
               </a:solidFill>
@@ -5501,36 +5535,14 @@
               <a:cs typeface="Calibri" panose="020F0502020204030204" pitchFamily="34" charset="0"/>
             </a:endParaRPr>
           </a:p>
-          <a:p>
-            <a:pPr algn="l"/>
-            <a:endParaRPr lang="en-GB" altLang="zh-CN" dirty="0">
-              <a:solidFill>
-                <a:srgbClr val="1F2328"/>
-              </a:solidFill>
-              <a:latin typeface="Calibri" panose="020F0502020204030204" pitchFamily="34" charset="0"/>
-              <a:ea typeface="Calibri" panose="020F0502020204030204" pitchFamily="34" charset="0"/>
-              <a:cs typeface="Calibri" panose="020F0502020204030204" pitchFamily="34" charset="0"/>
-            </a:endParaRPr>
-          </a:p>
-          <a:p>
-            <a:pPr algn="l"/>
-            <a:endParaRPr lang="en-GB" altLang="zh-CN" dirty="0">
-              <a:solidFill>
-                <a:srgbClr val="1F2328"/>
-              </a:solidFill>
-              <a:latin typeface="Calibri" panose="020F0502020204030204" pitchFamily="34" charset="0"/>
-              <a:ea typeface="Calibri" panose="020F0502020204030204" pitchFamily="34" charset="0"/>
-              <a:cs typeface="Calibri" panose="020F0502020204030204" pitchFamily="34" charset="0"/>
-            </a:endParaRPr>
-          </a:p>
         </p:txBody>
       </p:sp>
       <p:pic>
         <p:nvPicPr>
-          <p:cNvPr id="3" name="图片 2">
-            <a:extLst>
-              <a:ext uri="{FF2B5EF4-FFF2-40B4-BE49-F238E27FC236}">
-                <a16:creationId xmlns:a16="http://schemas.microsoft.com/office/drawing/2014/main" id="{BEC68CF4-A281-10C8-9E40-3542A3B115F5}"/>
+          <p:cNvPr id="4" name="图片 3">
+            <a:extLst>
+              <a:ext uri="{FF2B5EF4-FFF2-40B4-BE49-F238E27FC236}">
+                <a16:creationId xmlns:a16="http://schemas.microsoft.com/office/drawing/2014/main" id="{189BF5F7-96C1-3F0F-3DA0-3FC9A41B3AF9}"/>
               </a:ext>
             </a:extLst>
           </p:cNvPr>
@@ -5547,38 +5559,8 @@
         </p:blipFill>
         <p:spPr>
           <a:xfrm>
-            <a:off x="5632707" y="3442458"/>
-            <a:ext cx="5518287" cy="776924"/>
-          </a:xfrm>
-          <a:prstGeom prst="rect">
-            <a:avLst/>
-          </a:prstGeom>
-        </p:spPr>
-      </p:pic>
-      <p:pic>
-        <p:nvPicPr>
-          <p:cNvPr id="8" name="图片 7">
-            <a:extLst>
-              <a:ext uri="{FF2B5EF4-FFF2-40B4-BE49-F238E27FC236}">
-                <a16:creationId xmlns:a16="http://schemas.microsoft.com/office/drawing/2014/main" id="{821A56EE-46B4-4CD9-972D-D9723E337780}"/>
-              </a:ext>
-            </a:extLst>
-          </p:cNvPr>
-          <p:cNvPicPr>
-            <a:picLocks noChangeAspect="1"/>
-          </p:cNvPicPr>
-          <p:nvPr/>
-        </p:nvPicPr>
-        <p:blipFill>
-          <a:blip r:embed="rId3"/>
-          <a:stretch>
-            <a:fillRect/>
-          </a:stretch>
-        </p:blipFill>
-        <p:spPr>
-          <a:xfrm>
-            <a:off x="5497133" y="4882580"/>
-            <a:ext cx="5789436" cy="1214604"/>
+            <a:off x="280239" y="3661065"/>
+            <a:ext cx="5815761" cy="1062681"/>
           </a:xfrm>
           <a:prstGeom prst="rect">
             <a:avLst/>
@@ -5588,7 +5570,7 @@
     </p:spTree>
     <p:extLst>
       <p:ext uri="{BB962C8B-B14F-4D97-AF65-F5344CB8AC3E}">
-        <p14:creationId xmlns:p14="http://schemas.microsoft.com/office/powerpoint/2010/main" val="2249377140"/>
+        <p14:creationId xmlns:p14="http://schemas.microsoft.com/office/powerpoint/2010/main" val="785472582"/>
       </p:ext>
     </p:extLst>
   </p:cSld>
@@ -5634,33 +5616,26 @@
         </p:nvSpPr>
         <p:spPr>
           <a:xfrm>
-            <a:off x="0" y="2190956"/>
+            <a:off x="409575" y="352631"/>
             <a:ext cx="10515600" cy="1325563"/>
           </a:xfrm>
         </p:spPr>
         <p:txBody>
           <a:bodyPr>
-            <a:normAutofit fontScale="90000"/>
+            <a:normAutofit/>
           </a:bodyPr>
           <a:lstStyle/>
           <a:p>
             <a:r>
               <a:rPr lang="en-US" altLang="zh-CN" dirty="0"/>
-              <a:t>Experiment</a:t>
+              <a:t>Experiment results </a:t>
             </a:r>
             <a:br>
               <a:rPr lang="en-US" altLang="zh-CN" dirty="0"/>
             </a:br>
             <a:r>
               <a:rPr lang="en-US" altLang="zh-CN" dirty="0"/>
-              <a:t>results </a:t>
-            </a:r>
-            <a:br>
-              <a:rPr lang="en-US" altLang="zh-CN" dirty="0"/>
-            </a:br>
-            <a:r>
-              <a:rPr lang="en-US" altLang="zh-CN" dirty="0"/>
-              <a:t>(ML-20M split by time)</a:t>
+              <a:t>(ML-20M split by time) </a:t>
             </a:r>
             <a:endParaRPr lang="zh-CN" altLang="en-US" dirty="0"/>
           </a:p>
@@ -5695,12 +5670,56 @@
           </a:p>
         </p:txBody>
       </p:sp>
+      <p:sp>
+        <p:nvSpPr>
+          <p:cNvPr id="4" name="文本框 3">
+            <a:extLst>
+              <a:ext uri="{FF2B5EF4-FFF2-40B4-BE49-F238E27FC236}">
+                <a16:creationId xmlns:a16="http://schemas.microsoft.com/office/drawing/2014/main" id="{8B90889A-82A5-4ACD-CB34-01C0C8082D25}"/>
+              </a:ext>
+            </a:extLst>
+          </p:cNvPr>
+          <p:cNvSpPr txBox="1"/>
+          <p:nvPr/>
+        </p:nvSpPr>
+        <p:spPr>
+          <a:xfrm>
+            <a:off x="498529" y="1788480"/>
+            <a:ext cx="6096000" cy="461665"/>
+          </a:xfrm>
+          <a:prstGeom prst="rect">
+            <a:avLst/>
+          </a:prstGeom>
+          <a:noFill/>
+        </p:spPr>
+        <p:txBody>
+          <a:bodyPr wrap="square">
+            <a:spAutoFit/>
+          </a:bodyPr>
+          <a:lstStyle/>
+          <a:p>
+            <a:r>
+              <a:rPr lang="en-US" altLang="zh-CN" sz="2400" b="1" i="1" dirty="0">
+                <a:solidFill>
+                  <a:schemeClr val="accent1"/>
+                </a:solidFill>
+              </a:rPr>
+              <a:t>Train from scratch</a:t>
+            </a:r>
+            <a:endParaRPr lang="zh-CN" altLang="en-US" sz="2400" b="1" i="1" dirty="0">
+              <a:solidFill>
+                <a:schemeClr val="accent1"/>
+              </a:solidFill>
+            </a:endParaRPr>
+          </a:p>
+        </p:txBody>
+      </p:sp>
       <p:pic>
         <p:nvPicPr>
-          <p:cNvPr id="6" name="图片 5">
-            <a:extLst>
-              <a:ext uri="{FF2B5EF4-FFF2-40B4-BE49-F238E27FC236}">
-                <a16:creationId xmlns:a16="http://schemas.microsoft.com/office/drawing/2014/main" id="{B8ED214C-A9A5-CD26-047B-C0F5FF42C709}"/>
+          <p:cNvPr id="7" name="图片 6">
+            <a:extLst>
+              <a:ext uri="{FF2B5EF4-FFF2-40B4-BE49-F238E27FC236}">
+                <a16:creationId xmlns:a16="http://schemas.microsoft.com/office/drawing/2014/main" id="{7E954005-CB7C-472B-7E32-089D328CC031}"/>
               </a:ext>
             </a:extLst>
           </p:cNvPr>
@@ -5717,64 +5736,14 @@
         </p:blipFill>
         <p:spPr>
           <a:xfrm>
-            <a:off x="4974678" y="306429"/>
-            <a:ext cx="6153466" cy="6420180"/>
+            <a:off x="3581401" y="1788480"/>
+            <a:ext cx="6871438" cy="4876726"/>
           </a:xfrm>
           <a:prstGeom prst="rect">
             <a:avLst/>
           </a:prstGeom>
         </p:spPr>
       </p:pic>
-      <p:sp>
-        <p:nvSpPr>
-          <p:cNvPr id="8" name="文本框 7">
-            <a:extLst>
-              <a:ext uri="{FF2B5EF4-FFF2-40B4-BE49-F238E27FC236}">
-                <a16:creationId xmlns:a16="http://schemas.microsoft.com/office/drawing/2014/main" id="{6DE25EB5-8924-A1DD-4EB4-DAFACD8F2C17}"/>
-              </a:ext>
-            </a:extLst>
-          </p:cNvPr>
-          <p:cNvSpPr txBox="1"/>
-          <p:nvPr/>
-        </p:nvSpPr>
-        <p:spPr>
-          <a:xfrm>
-            <a:off x="106062" y="4149500"/>
-            <a:ext cx="6151704" cy="646331"/>
-          </a:xfrm>
-          <a:prstGeom prst="rect">
-            <a:avLst/>
-          </a:prstGeom>
-          <a:noFill/>
-        </p:spPr>
-        <p:txBody>
-          <a:bodyPr wrap="square">
-            <a:spAutoFit/>
-          </a:bodyPr>
-          <a:lstStyle/>
-          <a:p>
-            <a:r>
-              <a:rPr lang="en-US" altLang="zh-CN" dirty="0"/>
-              <a:t>Item embedding for transfer learning is trained </a:t>
-            </a:r>
-          </a:p>
-          <a:p>
-            <a:r>
-              <a:rPr lang="en-US" altLang="zh-CN" dirty="0"/>
-              <a:t>by normal </a:t>
-            </a:r>
-            <a:r>
-              <a:rPr lang="en-US" altLang="zh-CN" dirty="0" err="1"/>
-              <a:t>SASRec</a:t>
-            </a:r>
-            <a:r>
-              <a:rPr lang="en-US" altLang="zh-CN" dirty="0"/>
-              <a:t> in 50 epochs</a:t>
-            </a:r>
-            <a:endParaRPr lang="zh-CN" altLang="en-US" dirty="0"/>
-          </a:p>
-        </p:txBody>
-      </p:sp>
     </p:spTree>
     <p:extLst>
       <p:ext uri="{BB962C8B-B14F-4D97-AF65-F5344CB8AC3E}">
@@ -5824,28 +5793,66 @@
         </p:nvSpPr>
         <p:spPr>
           <a:xfrm>
-            <a:off x="239333" y="-28937"/>
+            <a:off x="409575" y="352631"/>
             <a:ext cx="10515600" cy="1325563"/>
           </a:xfrm>
         </p:spPr>
         <p:txBody>
+          <a:bodyPr>
+            <a:normAutofit/>
+          </a:bodyPr>
+          <a:lstStyle/>
+          <a:p>
+            <a:r>
+              <a:rPr lang="en-US" altLang="zh-CN" dirty="0"/>
+              <a:t>Experiment results </a:t>
+            </a:r>
+            <a:br>
+              <a:rPr lang="en-US" altLang="zh-CN" dirty="0"/>
+            </a:br>
+            <a:r>
+              <a:rPr lang="en-US" altLang="zh-CN" dirty="0"/>
+              <a:t>(ML-20M split by time) </a:t>
+            </a:r>
+            <a:endParaRPr lang="zh-CN" altLang="en-US" dirty="0"/>
+          </a:p>
+        </p:txBody>
+      </p:sp>
+      <p:sp>
+        <p:nvSpPr>
+          <p:cNvPr id="13" name="灯片编号占位符 12">
+            <a:extLst>
+              <a:ext uri="{FF2B5EF4-FFF2-40B4-BE49-F238E27FC236}">
+                <a16:creationId xmlns:a16="http://schemas.microsoft.com/office/drawing/2014/main" id="{237FFF84-6A5A-47F3-38B5-274BB362600D}"/>
+              </a:ext>
+            </a:extLst>
+          </p:cNvPr>
+          <p:cNvSpPr>
+            <a:spLocks noGrp="1"/>
+          </p:cNvSpPr>
+          <p:nvPr>
+            <p:ph type="sldNum" sz="quarter" idx="2"/>
+          </p:nvPr>
+        </p:nvSpPr>
+        <p:spPr/>
+        <p:txBody>
           <a:bodyPr/>
           <a:lstStyle/>
           <a:p>
-            <a:r>
-              <a:rPr lang="en-US" altLang="zh-CN" dirty="0"/>
-              <a:t>Results Analysis</a:t>
-            </a:r>
-            <a:endParaRPr lang="zh-CN" altLang="en-US" dirty="0"/>
-          </a:p>
-        </p:txBody>
-      </p:sp>
-      <p:sp>
-        <p:nvSpPr>
-          <p:cNvPr id="3" name="文本框 2">
-            <a:extLst>
-              <a:ext uri="{FF2B5EF4-FFF2-40B4-BE49-F238E27FC236}">
-                <a16:creationId xmlns:a16="http://schemas.microsoft.com/office/drawing/2014/main" id="{6A1CC81E-3473-6F67-CAEF-CCE2088384E7}"/>
+            <a:fld id="{86CB4B4D-7CA3-9044-876B-883B54F8677D}" type="slidenum">
+              <a:rPr lang="en-US" altLang="zh-CN" smtClean="0"/>
+              <a:t>6</a:t>
+            </a:fld>
+            <a:endParaRPr lang="zh-CN" altLang="en-US"/>
+          </a:p>
+        </p:txBody>
+      </p:sp>
+      <p:sp>
+        <p:nvSpPr>
+          <p:cNvPr id="4" name="文本框 3">
+            <a:extLst>
+              <a:ext uri="{FF2B5EF4-FFF2-40B4-BE49-F238E27FC236}">
+                <a16:creationId xmlns:a16="http://schemas.microsoft.com/office/drawing/2014/main" id="{8B90889A-82A5-4ACD-CB34-01C0C8082D25}"/>
               </a:ext>
             </a:extLst>
           </p:cNvPr>
@@ -5854,8 +5861,8 @@
         </p:nvSpPr>
         <p:spPr>
           <a:xfrm>
-            <a:off x="239332" y="379559"/>
-            <a:ext cx="9705555" cy="5632311"/>
+            <a:off x="409575" y="1678194"/>
+            <a:ext cx="9424100" cy="4524315"/>
           </a:xfrm>
           <a:prstGeom prst="rect">
             <a:avLst/>
@@ -5868,200 +5875,136 @@
           </a:bodyPr>
           <a:lstStyle/>
           <a:p>
-            <a:pPr marL="342900" indent="-342900" algn="l">
-              <a:buAutoNum type="arabicPeriod"/>
-            </a:pPr>
-            <a:endParaRPr lang="en-US" altLang="zh-CN" sz="2400" dirty="0">
+            <a:r>
+              <a:rPr lang="en-US" altLang="zh-CN" sz="2400" b="1" i="1" dirty="0">
+                <a:solidFill>
+                  <a:schemeClr val="accent1"/>
+                </a:solidFill>
+              </a:rPr>
+              <a:t>Transfer Learning </a:t>
+            </a:r>
+          </a:p>
+          <a:p>
+            <a:r>
+              <a:rPr lang="en-US" altLang="zh-CN" sz="2400" b="1" i="1" dirty="0">
+                <a:solidFill>
+                  <a:schemeClr val="accent1"/>
+                </a:solidFill>
+              </a:rPr>
+              <a:t>(frozen item embedding)</a:t>
+            </a:r>
+          </a:p>
+          <a:p>
+            <a:endParaRPr lang="en-US" altLang="zh-CN" sz="2400" b="1" i="1" dirty="0">
               <a:solidFill>
-                <a:srgbClr val="1F2328"/>
+                <a:schemeClr val="accent1"/>
               </a:solidFill>
-              <a:latin typeface="Calibri" panose="020F0502020204030204" pitchFamily="34" charset="0"/>
-              <a:ea typeface="Calibri" panose="020F0502020204030204" pitchFamily="34" charset="0"/>
-              <a:cs typeface="Calibri" panose="020F0502020204030204" pitchFamily="34" charset="0"/>
             </a:endParaRPr>
           </a:p>
           <a:p>
-            <a:pPr marL="342900" indent="-342900" algn="l">
-              <a:buAutoNum type="arabicPeriod"/>
-            </a:pPr>
-            <a:endParaRPr lang="en-US" altLang="zh-CN" sz="2400" dirty="0">
-              <a:solidFill>
-                <a:srgbClr val="1F2328"/>
-              </a:solidFill>
-              <a:latin typeface="Calibri" panose="020F0502020204030204" pitchFamily="34" charset="0"/>
-              <a:ea typeface="Calibri" panose="020F0502020204030204" pitchFamily="34" charset="0"/>
-              <a:cs typeface="Calibri" panose="020F0502020204030204" pitchFamily="34" charset="0"/>
-            </a:endParaRPr>
-          </a:p>
-          <a:p>
-            <a:pPr algn="l"/>
-            <a:r>
-              <a:rPr lang="en-US" altLang="zh-CN" sz="2400" dirty="0">
-                <a:solidFill>
-                  <a:srgbClr val="1F2328"/>
-                </a:solidFill>
-                <a:latin typeface="Calibri" panose="020F0502020204030204" pitchFamily="34" charset="0"/>
-                <a:ea typeface="Calibri" panose="020F0502020204030204" pitchFamily="34" charset="0"/>
-                <a:cs typeface="Calibri" panose="020F0502020204030204" pitchFamily="34" charset="0"/>
-              </a:rPr>
-              <a:t>Next item prediction outperforms all other models trained from scratch because of the accurate item embeddings as we can see from the experiment results.</a:t>
-            </a:r>
-          </a:p>
-          <a:p>
-            <a:pPr algn="l"/>
-            <a:endParaRPr lang="en-US" altLang="zh-CN" sz="2400" dirty="0">
-              <a:solidFill>
-                <a:srgbClr val="1F2328"/>
-              </a:solidFill>
-              <a:latin typeface="Calibri" panose="020F0502020204030204" pitchFamily="34" charset="0"/>
-              <a:ea typeface="Calibri" panose="020F0502020204030204" pitchFamily="34" charset="0"/>
-              <a:cs typeface="Calibri" panose="020F0502020204030204" pitchFamily="34" charset="0"/>
-            </a:endParaRPr>
-          </a:p>
-          <a:p>
-            <a:pPr algn="l"/>
-            <a:r>
-              <a:rPr lang="en-US" altLang="zh-CN" sz="2400" dirty="0">
-                <a:solidFill>
-                  <a:srgbClr val="1F2328"/>
-                </a:solidFill>
-                <a:latin typeface="Calibri" panose="020F0502020204030204" pitchFamily="34" charset="0"/>
-                <a:ea typeface="Calibri" panose="020F0502020204030204" pitchFamily="34" charset="0"/>
-                <a:cs typeface="Calibri" panose="020F0502020204030204" pitchFamily="34" charset="0"/>
-              </a:rPr>
-              <a:t>Window predictor is much more helpful when learning other predicted used parameters.</a:t>
-            </a:r>
-          </a:p>
-          <a:p>
-            <a:pPr algn="l"/>
-            <a:endParaRPr lang="en-US" altLang="zh-CN" sz="2400" dirty="0">
-              <a:solidFill>
-                <a:srgbClr val="1F2328"/>
-              </a:solidFill>
-              <a:latin typeface="Calibri" panose="020F0502020204030204" pitchFamily="34" charset="0"/>
-              <a:ea typeface="Calibri" panose="020F0502020204030204" pitchFamily="34" charset="0"/>
-              <a:cs typeface="Calibri" panose="020F0502020204030204" pitchFamily="34" charset="0"/>
-            </a:endParaRPr>
-          </a:p>
-          <a:p>
-            <a:pPr algn="l"/>
-            <a:endParaRPr lang="en-US" altLang="zh-CN" sz="2400" dirty="0">
-              <a:solidFill>
-                <a:srgbClr val="1F2328"/>
-              </a:solidFill>
-              <a:latin typeface="Calibri" panose="020F0502020204030204" pitchFamily="34" charset="0"/>
-              <a:ea typeface="Calibri" panose="020F0502020204030204" pitchFamily="34" charset="0"/>
-              <a:cs typeface="Calibri" panose="020F0502020204030204" pitchFamily="34" charset="0"/>
-            </a:endParaRPr>
-          </a:p>
-          <a:p>
-            <a:pPr algn="l"/>
-            <a:endParaRPr lang="en-US" altLang="zh-CN" sz="2400" dirty="0">
-              <a:solidFill>
-                <a:srgbClr val="1F2328"/>
-              </a:solidFill>
-              <a:latin typeface="Calibri" panose="020F0502020204030204" pitchFamily="34" charset="0"/>
-              <a:ea typeface="Calibri" panose="020F0502020204030204" pitchFamily="34" charset="0"/>
-              <a:cs typeface="Calibri" panose="020F0502020204030204" pitchFamily="34" charset="0"/>
-            </a:endParaRPr>
-          </a:p>
-          <a:p>
-            <a:pPr algn="l"/>
-            <a:endParaRPr lang="en-US" altLang="zh-CN" sz="2400" dirty="0">
-              <a:solidFill>
-                <a:srgbClr val="1F2328"/>
-              </a:solidFill>
-              <a:latin typeface="Calibri" panose="020F0502020204030204" pitchFamily="34" charset="0"/>
-              <a:ea typeface="Calibri" panose="020F0502020204030204" pitchFamily="34" charset="0"/>
-              <a:cs typeface="Calibri" panose="020F0502020204030204" pitchFamily="34" charset="0"/>
-            </a:endParaRPr>
-          </a:p>
-          <a:p>
-            <a:pPr algn="l"/>
-            <a:r>
-              <a:rPr lang="en-US" altLang="zh-CN" sz="2400" dirty="0">
-                <a:solidFill>
-                  <a:srgbClr val="1F2328"/>
-                </a:solidFill>
-                <a:latin typeface="Calibri" panose="020F0502020204030204" pitchFamily="34" charset="0"/>
-                <a:ea typeface="Calibri" panose="020F0502020204030204" pitchFamily="34" charset="0"/>
-                <a:cs typeface="Calibri" panose="020F0502020204030204" pitchFamily="34" charset="0"/>
-              </a:rPr>
-              <a:t>We currently used the temporal window to split the dataset, time features could potentially make some help during the prediction.</a:t>
-            </a:r>
-          </a:p>
-          <a:p>
-            <a:pPr algn="l"/>
-            <a:endParaRPr lang="en-GB" altLang="zh-CN" sz="2400" dirty="0">
-              <a:solidFill>
-                <a:srgbClr val="1F2328"/>
-              </a:solidFill>
-              <a:latin typeface="Calibri" panose="020F0502020204030204" pitchFamily="34" charset="0"/>
-              <a:ea typeface="Calibri" panose="020F0502020204030204" pitchFamily="34" charset="0"/>
-              <a:cs typeface="Calibri" panose="020F0502020204030204" pitchFamily="34" charset="0"/>
-            </a:endParaRPr>
-          </a:p>
-        </p:txBody>
-      </p:sp>
-      <p:sp>
-        <p:nvSpPr>
-          <p:cNvPr id="5" name="标题 1">
-            <a:extLst>
-              <a:ext uri="{FF2B5EF4-FFF2-40B4-BE49-F238E27FC236}">
-                <a16:creationId xmlns:a16="http://schemas.microsoft.com/office/drawing/2014/main" id="{BE2779D0-2E01-86BD-AC66-BA4F9A73C161}"/>
-              </a:ext>
-            </a:extLst>
-          </p:cNvPr>
-          <p:cNvSpPr txBox="1">
-            <a:spLocks/>
-          </p:cNvSpPr>
+            <a:endParaRPr lang="en-US" altLang="zh-CN" sz="2400" dirty="0"/>
+          </a:p>
+          <a:p>
+            <a:r>
+              <a:rPr lang="en-US" altLang="zh-CN" sz="2400" dirty="0"/>
+              <a:t>Learning rate = 0.003</a:t>
+            </a:r>
+          </a:p>
+          <a:p>
+            <a:r>
+              <a:rPr lang="en-US" altLang="zh-CN" sz="2400" dirty="0" err="1"/>
+              <a:t>max_len</a:t>
+            </a:r>
+            <a:r>
+              <a:rPr lang="en-US" altLang="zh-CN" sz="2400" dirty="0"/>
+              <a:t> = 200</a:t>
+            </a:r>
+          </a:p>
+          <a:p>
+            <a:r>
+              <a:rPr lang="en-US" altLang="zh-CN" sz="2400" dirty="0"/>
+              <a:t>Loss = sampled </a:t>
+            </a:r>
+            <a:r>
+              <a:rPr lang="en-US" altLang="zh-CN" sz="2400" dirty="0" err="1"/>
+              <a:t>softmax</a:t>
+            </a:r>
+            <a:r>
+              <a:rPr lang="en-US" altLang="zh-CN" sz="2400" dirty="0"/>
+              <a:t> loss</a:t>
+            </a:r>
+          </a:p>
+          <a:p>
+            <a:endParaRPr lang="en-US" altLang="zh-CN" sz="2400" b="1" i="1" dirty="0"/>
+          </a:p>
+          <a:p>
+            <a:r>
+              <a:rPr lang="en-US" altLang="zh-CN" sz="2400" b="1" dirty="0"/>
+              <a:t>Item embedding </a:t>
+            </a:r>
+          </a:p>
+          <a:p>
+            <a:r>
+              <a:rPr lang="en-US" altLang="zh-CN" sz="2400" b="1" dirty="0"/>
+              <a:t>is trained from </a:t>
+            </a:r>
+          </a:p>
+          <a:p>
+            <a:r>
+              <a:rPr lang="en-US" altLang="zh-CN" sz="2400" b="1" dirty="0"/>
+              <a:t>Normal </a:t>
+            </a:r>
+            <a:r>
+              <a:rPr lang="en-US" altLang="zh-CN" sz="2400" b="1" dirty="0" err="1"/>
+              <a:t>SASRec</a:t>
+            </a:r>
+            <a:r>
+              <a:rPr lang="en-US" altLang="zh-CN" sz="2400" b="1" dirty="0"/>
+              <a:t> </a:t>
+            </a:r>
+          </a:p>
+          <a:p>
+            <a:r>
+              <a:rPr lang="en-US" altLang="zh-CN" sz="2400" b="1" dirty="0"/>
+              <a:t>(Time-ignorance).</a:t>
+            </a:r>
+          </a:p>
+        </p:txBody>
+      </p:sp>
+      <p:pic>
+        <p:nvPicPr>
+          <p:cNvPr id="5" name="图片 4">
+            <a:extLst>
+              <a:ext uri="{FF2B5EF4-FFF2-40B4-BE49-F238E27FC236}">
+                <a16:creationId xmlns:a16="http://schemas.microsoft.com/office/drawing/2014/main" id="{6B10FA4E-24C5-613A-A2B3-77434C6A2A76}"/>
+              </a:ext>
+            </a:extLst>
+          </p:cNvPr>
+          <p:cNvPicPr>
+            <a:picLocks noChangeAspect="1"/>
+          </p:cNvPicPr>
           <p:nvPr/>
-        </p:nvSpPr>
+        </p:nvPicPr>
+        <p:blipFill>
+          <a:blip r:embed="rId2"/>
+          <a:stretch>
+            <a:fillRect/>
+          </a:stretch>
+        </p:blipFill>
         <p:spPr>
           <a:xfrm>
-            <a:off x="189935" y="3487623"/>
-            <a:ext cx="10515600" cy="1325563"/>
+            <a:off x="4620167" y="1744215"/>
+            <a:ext cx="6733633" cy="4761154"/>
           </a:xfrm>
           <a:prstGeom prst="rect">
             <a:avLst/>
           </a:prstGeom>
         </p:spPr>
-        <p:txBody>
-          <a:bodyPr vert="horz" lIns="91440" tIns="45720" rIns="91440" bIns="45720" rtlCol="0" anchor="ctr">
-            <a:normAutofit/>
-          </a:bodyPr>
-          <a:lstStyle>
-            <a:lvl1pPr algn="l" defTabSz="914400" rtl="0" eaLnBrk="1" latinLnBrk="0" hangingPunct="1">
-              <a:lnSpc>
-                <a:spcPct val="90000"/>
-              </a:lnSpc>
-              <a:spcBef>
-                <a:spcPct val="0"/>
-              </a:spcBef>
-              <a:buNone/>
-              <a:defRPr sz="4400" kern="1200">
-                <a:solidFill>
-                  <a:schemeClr val="tx1"/>
-                </a:solidFill>
-                <a:latin typeface="+mj-lt"/>
-                <a:ea typeface="+mj-ea"/>
-                <a:cs typeface="+mj-cs"/>
-              </a:defRPr>
-            </a:lvl1pPr>
-          </a:lstStyle>
-          <a:p>
-            <a:r>
-              <a:rPr lang="en-US" altLang="zh-CN" dirty="0"/>
-              <a:t>Assumption</a:t>
-            </a:r>
-            <a:endParaRPr lang="zh-CN" altLang="en-US" dirty="0"/>
-          </a:p>
-        </p:txBody>
-      </p:sp>
+      </p:pic>
     </p:spTree>
     <p:extLst>
       <p:ext uri="{BB962C8B-B14F-4D97-AF65-F5344CB8AC3E}">
-        <p14:creationId xmlns:p14="http://schemas.microsoft.com/office/powerpoint/2010/main" val="3722898602"/>
+        <p14:creationId xmlns:p14="http://schemas.microsoft.com/office/powerpoint/2010/main" val="3385110584"/>
       </p:ext>
     </p:extLst>
   </p:cSld>
@@ -6107,7 +6050,7 @@
         </p:nvSpPr>
         <p:spPr>
           <a:xfrm>
-            <a:off x="239333" y="0"/>
+            <a:off x="239333" y="-28937"/>
             <a:ext cx="10515600" cy="1325563"/>
           </a:xfrm>
         </p:spPr>
@@ -6117,7 +6060,7 @@
           <a:p>
             <a:r>
               <a:rPr lang="en-US" altLang="zh-CN" dirty="0"/>
-              <a:t>Time Features</a:t>
+              <a:t>Results Analysis</a:t>
             </a:r>
             <a:endParaRPr lang="zh-CN" altLang="en-US" dirty="0"/>
           </a:p>
@@ -6125,39 +6068,10 @@
       </p:sp>
       <p:sp>
         <p:nvSpPr>
-          <p:cNvPr id="6" name="灯片编号占位符 5">
-            <a:extLst>
-              <a:ext uri="{FF2B5EF4-FFF2-40B4-BE49-F238E27FC236}">
-                <a16:creationId xmlns:a16="http://schemas.microsoft.com/office/drawing/2014/main" id="{064315A4-3CF4-4926-C9FA-2AFFC911ABCF}"/>
-              </a:ext>
-            </a:extLst>
-          </p:cNvPr>
-          <p:cNvSpPr>
-            <a:spLocks noGrp="1"/>
-          </p:cNvSpPr>
-          <p:nvPr>
-            <p:ph type="sldNum" sz="quarter" idx="2"/>
-          </p:nvPr>
-        </p:nvSpPr>
-        <p:spPr/>
-        <p:txBody>
-          <a:bodyPr/>
-          <a:lstStyle/>
-          <a:p>
-            <a:fld id="{86CB4B4D-7CA3-9044-876B-883B54F8677D}" type="slidenum">
-              <a:rPr lang="en-US" altLang="zh-CN" smtClean="0"/>
-              <a:t>7</a:t>
-            </a:fld>
-            <a:endParaRPr lang="zh-CN" altLang="en-US"/>
-          </a:p>
-        </p:txBody>
-      </p:sp>
-      <p:sp>
-        <p:nvSpPr>
-          <p:cNvPr id="8" name="文本框 7">
-            <a:extLst>
-              <a:ext uri="{FF2B5EF4-FFF2-40B4-BE49-F238E27FC236}">
-                <a16:creationId xmlns:a16="http://schemas.microsoft.com/office/drawing/2014/main" id="{4E4A8798-EA4E-ABBE-4BD6-FA00651B9CCE}"/>
+          <p:cNvPr id="3" name="文本框 2">
+            <a:extLst>
+              <a:ext uri="{FF2B5EF4-FFF2-40B4-BE49-F238E27FC236}">
+                <a16:creationId xmlns:a16="http://schemas.microsoft.com/office/drawing/2014/main" id="{6A1CC81E-3473-6F67-CAEF-CCE2088384E7}"/>
               </a:ext>
             </a:extLst>
           </p:cNvPr>
@@ -6166,8 +6080,8 @@
         </p:nvSpPr>
         <p:spPr>
           <a:xfrm>
-            <a:off x="286772" y="1296626"/>
-            <a:ext cx="9241156" cy="4524315"/>
+            <a:off x="239332" y="379559"/>
+            <a:ext cx="9705555" cy="2308324"/>
           </a:xfrm>
           <a:prstGeom prst="rect">
             <a:avLst/>
@@ -6180,43 +6094,9 @@
           </a:bodyPr>
           <a:lstStyle/>
           <a:p>
-            <a:pPr algn="l"/>
-            <a:r>
-              <a:rPr lang="en-US" altLang="zh-CN" sz="2400" dirty="0">
-                <a:solidFill>
-                  <a:srgbClr val="1F2328"/>
-                </a:solidFill>
-                <a:latin typeface="Calibri" panose="020F0502020204030204" pitchFamily="34" charset="0"/>
-                <a:ea typeface="Calibri" panose="020F0502020204030204" pitchFamily="34" charset="0"/>
-                <a:cs typeface="Calibri" panose="020F0502020204030204" pitchFamily="34" charset="0"/>
-              </a:rPr>
-              <a:t>Follows the instruction of </a:t>
-            </a:r>
-            <a:r>
-              <a:rPr lang="en-US" altLang="zh-CN" sz="2400" dirty="0" err="1">
-                <a:solidFill>
-                  <a:srgbClr val="1F2328"/>
-                </a:solidFill>
-                <a:latin typeface="Calibri" panose="020F0502020204030204" pitchFamily="34" charset="0"/>
-                <a:ea typeface="Calibri" panose="020F0502020204030204" pitchFamily="34" charset="0"/>
-                <a:cs typeface="Calibri" panose="020F0502020204030204" pitchFamily="34" charset="0"/>
-              </a:rPr>
-              <a:t>TiSASRec</a:t>
-            </a:r>
-            <a:r>
-              <a:rPr lang="en-US" altLang="zh-CN" sz="2400" dirty="0">
-                <a:solidFill>
-                  <a:srgbClr val="1F2328"/>
-                </a:solidFill>
-                <a:latin typeface="Calibri" panose="020F0502020204030204" pitchFamily="34" charset="0"/>
-                <a:ea typeface="Calibri" panose="020F0502020204030204" pitchFamily="34" charset="0"/>
-                <a:cs typeface="Calibri" panose="020F0502020204030204" pitchFamily="34" charset="0"/>
-              </a:rPr>
-              <a:t>:</a:t>
-            </a:r>
-          </a:p>
-          <a:p>
-            <a:pPr algn="l"/>
+            <a:pPr marL="342900" indent="-342900" algn="l">
+              <a:buAutoNum type="arabicPeriod"/>
+            </a:pPr>
             <a:endParaRPr lang="en-US" altLang="zh-CN" sz="2400" dirty="0">
               <a:solidFill>
                 <a:srgbClr val="1F2328"/>
@@ -6227,75 +6107,9 @@
             </a:endParaRPr>
           </a:p>
           <a:p>
-            <a:pPr algn="l"/>
-            <a:r>
-              <a:rPr lang="en-US" altLang="zh-CN" sz="2400" dirty="0">
-                <a:solidFill>
-                  <a:srgbClr val="1F2328"/>
-                </a:solidFill>
-                <a:latin typeface="Calibri" panose="020F0502020204030204" pitchFamily="34" charset="0"/>
-                <a:ea typeface="Calibri" panose="020F0502020204030204" pitchFamily="34" charset="0"/>
-                <a:cs typeface="Calibri" panose="020F0502020204030204" pitchFamily="34" charset="0"/>
-              </a:rPr>
-              <a:t>Including </a:t>
-            </a:r>
-          </a:p>
-          <a:p>
-            <a:pPr marL="457200" indent="-457200" algn="l">
+            <a:pPr marL="342900" indent="-342900" algn="l">
               <a:buAutoNum type="arabicPeriod"/>
             </a:pPr>
-            <a:r>
-              <a:rPr lang="en-US" altLang="zh-CN" sz="2400" dirty="0">
-                <a:solidFill>
-                  <a:srgbClr val="1F2328"/>
-                </a:solidFill>
-                <a:latin typeface="Calibri" panose="020F0502020204030204" pitchFamily="34" charset="0"/>
-                <a:ea typeface="Calibri" panose="020F0502020204030204" pitchFamily="34" charset="0"/>
-                <a:cs typeface="Calibri" panose="020F0502020204030204" pitchFamily="34" charset="0"/>
-              </a:rPr>
-              <a:t>the scaled (</a:t>
-            </a:r>
-            <a:r>
-              <a:rPr lang="en-US" altLang="zh-CN" sz="2400" dirty="0" err="1">
-                <a:solidFill>
-                  <a:srgbClr val="1F2328"/>
-                </a:solidFill>
-                <a:latin typeface="Calibri" panose="020F0502020204030204" pitchFamily="34" charset="0"/>
-                <a:ea typeface="Calibri" panose="020F0502020204030204" pitchFamily="34" charset="0"/>
-                <a:cs typeface="Calibri" panose="020F0502020204030204" pitchFamily="34" charset="0"/>
-              </a:rPr>
-              <a:t>personalised</a:t>
-            </a:r>
-            <a:r>
-              <a:rPr lang="en-US" altLang="zh-CN" sz="2400" dirty="0">
-                <a:solidFill>
-                  <a:srgbClr val="1F2328"/>
-                </a:solidFill>
-                <a:latin typeface="Calibri" panose="020F0502020204030204" pitchFamily="34" charset="0"/>
-                <a:ea typeface="Calibri" panose="020F0502020204030204" pitchFamily="34" charset="0"/>
-                <a:cs typeface="Calibri" panose="020F0502020204030204" pitchFamily="34" charset="0"/>
-              </a:rPr>
-              <a:t>) relative time interval embedding (Time Matrix)</a:t>
-            </a:r>
-          </a:p>
-          <a:p>
-            <a:pPr marL="457200" indent="-457200" algn="l">
-              <a:buAutoNum type="arabicPeriod"/>
-            </a:pPr>
-            <a:r>
-              <a:rPr lang="en-US" altLang="zh-CN" sz="2400" dirty="0">
-                <a:solidFill>
-                  <a:srgbClr val="1F2328"/>
-                </a:solidFill>
-                <a:latin typeface="Calibri" panose="020F0502020204030204" pitchFamily="34" charset="0"/>
-                <a:ea typeface="Calibri" panose="020F0502020204030204" pitchFamily="34" charset="0"/>
-                <a:cs typeface="Calibri" panose="020F0502020204030204" pitchFamily="34" charset="0"/>
-              </a:rPr>
-              <a:t>Learnable absolute positional embedding.</a:t>
-            </a:r>
-          </a:p>
-          <a:p>
-            <a:pPr algn="l"/>
             <a:endParaRPr lang="en-US" altLang="zh-CN" sz="2400" dirty="0">
               <a:solidFill>
                 <a:srgbClr val="1F2328"/>
@@ -6316,12 +6130,34 @@
                 <a:ea typeface="Calibri" panose="020F0502020204030204" pitchFamily="34" charset="0"/>
                 <a:cs typeface="Calibri" panose="020F0502020204030204" pitchFamily="34" charset="0"/>
               </a:rPr>
-              <a:t>Problem: More memory cost</a:t>
+              <a:t>Use absolute timestamps (time diff between an action’s timestamp with the </a:t>
+            </a:r>
+            <a:r>
+              <a:rPr lang="en-US" altLang="zh-CN" sz="2400" dirty="0" err="1">
+                <a:solidFill>
+                  <a:srgbClr val="1F2328"/>
+                </a:solidFill>
+                <a:latin typeface="Calibri" panose="020F0502020204030204" pitchFamily="34" charset="0"/>
+                <a:ea typeface="Calibri" panose="020F0502020204030204" pitchFamily="34" charset="0"/>
+                <a:cs typeface="Calibri" panose="020F0502020204030204" pitchFamily="34" charset="0"/>
+              </a:rPr>
+              <a:t>lastest</a:t>
+            </a:r>
+            <a:r>
+              <a:rPr lang="en-US" altLang="zh-CN" sz="2400" dirty="0">
+                <a:solidFill>
+                  <a:srgbClr val="1F2328"/>
+                </a:solidFill>
+                <a:latin typeface="Calibri" panose="020F0502020204030204" pitchFamily="34" charset="0"/>
+                <a:ea typeface="Calibri" panose="020F0502020204030204" pitchFamily="34" charset="0"/>
+                <a:cs typeface="Calibri" panose="020F0502020204030204" pitchFamily="34" charset="0"/>
+              </a:rPr>
+              <a:t> timestamp in the current action sequence) will improve the model performance on Recall@10.</a:t>
             </a:r>
           </a:p>
           <a:p>
             <a:pPr algn="l"/>
-            <a:endParaRPr lang="en-US" altLang="zh-CN" sz="2400" dirty="0">
+            <a:endParaRPr lang="en-GB" altLang="zh-CN" sz="2400" dirty="0">
               <a:solidFill>
                 <a:srgbClr val="1F2328"/>
               </a:solidFill>
@@ -6330,10 +6166,94 @@
               <a:cs typeface="Calibri" panose="020F0502020204030204" pitchFamily="34" charset="0"/>
             </a:endParaRPr>
           </a:p>
+        </p:txBody>
+      </p:sp>
+      <p:sp>
+        <p:nvSpPr>
+          <p:cNvPr id="5" name="标题 1">
+            <a:extLst>
+              <a:ext uri="{FF2B5EF4-FFF2-40B4-BE49-F238E27FC236}">
+                <a16:creationId xmlns:a16="http://schemas.microsoft.com/office/drawing/2014/main" id="{BE2779D0-2E01-86BD-AC66-BA4F9A73C161}"/>
+              </a:ext>
+            </a:extLst>
+          </p:cNvPr>
+          <p:cNvSpPr txBox="1">
+            <a:spLocks/>
+          </p:cNvSpPr>
+          <p:nvPr/>
+        </p:nvSpPr>
+        <p:spPr>
+          <a:xfrm>
+            <a:off x="239333" y="2433597"/>
+            <a:ext cx="10515600" cy="1325563"/>
+          </a:xfrm>
+          <a:prstGeom prst="rect">
+            <a:avLst/>
+          </a:prstGeom>
+        </p:spPr>
+        <p:txBody>
+          <a:bodyPr vert="horz" lIns="91440" tIns="45720" rIns="91440" bIns="45720" rtlCol="0" anchor="ctr">
+            <a:normAutofit/>
+          </a:bodyPr>
+          <a:lstStyle>
+            <a:lvl1pPr algn="l" defTabSz="914400" rtl="0" eaLnBrk="1" latinLnBrk="0" hangingPunct="1">
+              <a:lnSpc>
+                <a:spcPct val="90000"/>
+              </a:lnSpc>
+              <a:spcBef>
+                <a:spcPct val="0"/>
+              </a:spcBef>
+              <a:buNone/>
+              <a:defRPr sz="4400" kern="1200">
+                <a:solidFill>
+                  <a:schemeClr val="tx1"/>
+                </a:solidFill>
+                <a:latin typeface="+mj-lt"/>
+                <a:ea typeface="+mj-ea"/>
+                <a:cs typeface="+mj-cs"/>
+              </a:defRPr>
+            </a:lvl1pPr>
+          </a:lstStyle>
+          <a:p>
+            <a:r>
+              <a:rPr lang="en-US" altLang="zh-CN" dirty="0"/>
+              <a:t>Assumption</a:t>
+            </a:r>
+            <a:endParaRPr lang="zh-CN" altLang="en-US" dirty="0"/>
+          </a:p>
+        </p:txBody>
+      </p:sp>
+      <p:sp>
+        <p:nvSpPr>
+          <p:cNvPr id="6" name="文本框 5">
+            <a:extLst>
+              <a:ext uri="{FF2B5EF4-FFF2-40B4-BE49-F238E27FC236}">
+                <a16:creationId xmlns:a16="http://schemas.microsoft.com/office/drawing/2014/main" id="{7569E526-403F-7937-93D2-6199DB85C076}"/>
+              </a:ext>
+            </a:extLst>
+          </p:cNvPr>
+          <p:cNvSpPr txBox="1"/>
+          <p:nvPr/>
+        </p:nvSpPr>
+        <p:spPr>
+          <a:xfrm>
+            <a:off x="239332" y="3695802"/>
+            <a:ext cx="9778280" cy="1569660"/>
+          </a:xfrm>
+          <a:prstGeom prst="rect">
+            <a:avLst/>
+          </a:prstGeom>
+          <a:noFill/>
+        </p:spPr>
+        <p:txBody>
+          <a:bodyPr wrap="square">
+            <a:spAutoFit/>
+          </a:bodyPr>
+          <a:lstStyle/>
           <a:p>
             <a:pPr algn="l"/>
             <a:r>
-              <a:rPr lang="en-US" altLang="zh-CN" sz="2400" dirty="0">
+              <a:rPr lang="en-GB" altLang="zh-CN" sz="2400" dirty="0" err="1">
                 <a:solidFill>
                   <a:srgbClr val="1F2328"/>
                 </a:solidFill>
@@ -6341,21 +6261,24 @@
                 <a:ea typeface="Calibri" panose="020F0502020204030204" pitchFamily="34" charset="0"/>
                 <a:cs typeface="Calibri" panose="020F0502020204030204" pitchFamily="34" charset="0"/>
               </a:rPr>
-              <a:t>I used </a:t>
-            </a:r>
-            <a:r>
-              <a:rPr lang="en-US" altLang="zh-CN" sz="2400" dirty="0">
-                <a:solidFill>
-                  <a:srgbClr val="C00000"/>
+              <a:t>PinnerFormer</a:t>
+            </a:r>
+            <a:r>
+              <a:rPr lang="en-GB" altLang="zh-CN" sz="2400" dirty="0">
+                <a:solidFill>
+                  <a:srgbClr val="1F2328"/>
                 </a:solidFill>
                 <a:latin typeface="Calibri" panose="020F0502020204030204" pitchFamily="34" charset="0"/>
                 <a:ea typeface="Calibri" panose="020F0502020204030204" pitchFamily="34" charset="0"/>
                 <a:cs typeface="Calibri" panose="020F0502020204030204" pitchFamily="34" charset="0"/>
               </a:rPr>
-              <a:t>128</a:t>
-            </a:r>
-            <a:r>
-              <a:rPr lang="en-US" altLang="zh-CN" sz="2400" dirty="0">
+              <a:t> suggests to use both relative timestamp (and the time gap between each two  actions in the sequence, setting the last one to zero.) and absolute timestamp (already done). </a:t>
+            </a:r>
+          </a:p>
+          <a:p>
+            <a:pPr algn="l"/>
+            <a:r>
+              <a:rPr lang="en-GB" altLang="zh-CN" sz="2400" dirty="0">
                 <a:solidFill>
                   <a:srgbClr val="1F2328"/>
                 </a:solidFill>
@@ -6363,128 +6286,7 @@
                 <a:ea typeface="Calibri" panose="020F0502020204030204" pitchFamily="34" charset="0"/>
                 <a:cs typeface="Calibri" panose="020F0502020204030204" pitchFamily="34" charset="0"/>
               </a:rPr>
-              <a:t> as batch size </a:t>
-            </a:r>
-            <a:r>
-              <a:rPr lang="en-US" altLang="zh-CN" sz="2400" dirty="0">
-                <a:solidFill>
-                  <a:srgbClr val="C00000"/>
-                </a:solidFill>
-                <a:latin typeface="Calibri" panose="020F0502020204030204" pitchFamily="34" charset="0"/>
-                <a:ea typeface="Calibri" panose="020F0502020204030204" pitchFamily="34" charset="0"/>
-                <a:cs typeface="Calibri" panose="020F0502020204030204" pitchFamily="34" charset="0"/>
-              </a:rPr>
-              <a:t>200</a:t>
-            </a:r>
-            <a:r>
-              <a:rPr lang="en-US" altLang="zh-CN" sz="2400" dirty="0">
-                <a:solidFill>
-                  <a:srgbClr val="1F2328"/>
-                </a:solidFill>
-                <a:latin typeface="Calibri" panose="020F0502020204030204" pitchFamily="34" charset="0"/>
-                <a:ea typeface="Calibri" panose="020F0502020204030204" pitchFamily="34" charset="0"/>
-                <a:cs typeface="Calibri" panose="020F0502020204030204" pitchFamily="34" charset="0"/>
-              </a:rPr>
-              <a:t> as </a:t>
-            </a:r>
-            <a:r>
-              <a:rPr lang="en-US" altLang="zh-CN" sz="2400" dirty="0" err="1">
-                <a:solidFill>
-                  <a:srgbClr val="1F2328"/>
-                </a:solidFill>
-                <a:latin typeface="Calibri" panose="020F0502020204030204" pitchFamily="34" charset="0"/>
-                <a:ea typeface="Calibri" panose="020F0502020204030204" pitchFamily="34" charset="0"/>
-                <a:cs typeface="Calibri" panose="020F0502020204030204" pitchFamily="34" charset="0"/>
-              </a:rPr>
-              <a:t>maxlen</a:t>
-            </a:r>
-            <a:r>
-              <a:rPr lang="en-US" altLang="zh-CN" sz="2400" dirty="0">
-                <a:solidFill>
-                  <a:srgbClr val="1F2328"/>
-                </a:solidFill>
-                <a:latin typeface="Calibri" panose="020F0502020204030204" pitchFamily="34" charset="0"/>
-                <a:ea typeface="Calibri" panose="020F0502020204030204" pitchFamily="34" charset="0"/>
-                <a:cs typeface="Calibri" panose="020F0502020204030204" pitchFamily="34" charset="0"/>
-              </a:rPr>
-              <a:t> before, but  this will cause memory error using time features. Currently </a:t>
-            </a:r>
-            <a:r>
-              <a:rPr lang="en-US" altLang="zh-CN" sz="2400" dirty="0">
-                <a:solidFill>
-                  <a:srgbClr val="C00000"/>
-                </a:solidFill>
-                <a:latin typeface="Calibri" panose="020F0502020204030204" pitchFamily="34" charset="0"/>
-                <a:ea typeface="Calibri" panose="020F0502020204030204" pitchFamily="34" charset="0"/>
-                <a:cs typeface="Calibri" panose="020F0502020204030204" pitchFamily="34" charset="0"/>
-              </a:rPr>
-              <a:t>64</a:t>
-            </a:r>
-            <a:r>
-              <a:rPr lang="en-US" altLang="zh-CN" sz="2400" dirty="0">
-                <a:solidFill>
-                  <a:srgbClr val="1F2328"/>
-                </a:solidFill>
-                <a:latin typeface="Calibri" panose="020F0502020204030204" pitchFamily="34" charset="0"/>
-                <a:ea typeface="Calibri" panose="020F0502020204030204" pitchFamily="34" charset="0"/>
-                <a:cs typeface="Calibri" panose="020F0502020204030204" pitchFamily="34" charset="0"/>
-              </a:rPr>
-              <a:t> as batch size and</a:t>
-            </a:r>
-            <a:r>
-              <a:rPr lang="en-US" altLang="zh-CN" sz="2400" dirty="0">
-                <a:solidFill>
-                  <a:srgbClr val="FF0000"/>
-                </a:solidFill>
-                <a:latin typeface="Calibri" panose="020F0502020204030204" pitchFamily="34" charset="0"/>
-                <a:ea typeface="Calibri" panose="020F0502020204030204" pitchFamily="34" charset="0"/>
-                <a:cs typeface="Calibri" panose="020F0502020204030204" pitchFamily="34" charset="0"/>
-              </a:rPr>
-              <a:t> </a:t>
-            </a:r>
-            <a:r>
-              <a:rPr lang="en-US" altLang="zh-CN" sz="2400" dirty="0">
-                <a:solidFill>
-                  <a:srgbClr val="C00000"/>
-                </a:solidFill>
-                <a:latin typeface="Calibri" panose="020F0502020204030204" pitchFamily="34" charset="0"/>
-                <a:ea typeface="Calibri" panose="020F0502020204030204" pitchFamily="34" charset="0"/>
-                <a:cs typeface="Calibri" panose="020F0502020204030204" pitchFamily="34" charset="0"/>
-              </a:rPr>
-              <a:t>50</a:t>
-            </a:r>
-            <a:r>
-              <a:rPr lang="en-US" altLang="zh-CN" sz="2400" dirty="0">
-                <a:solidFill>
-                  <a:srgbClr val="FF0000"/>
-                </a:solidFill>
-                <a:latin typeface="Calibri" panose="020F0502020204030204" pitchFamily="34" charset="0"/>
-                <a:ea typeface="Calibri" panose="020F0502020204030204" pitchFamily="34" charset="0"/>
-                <a:cs typeface="Calibri" panose="020F0502020204030204" pitchFamily="34" charset="0"/>
-              </a:rPr>
-              <a:t> </a:t>
-            </a:r>
-            <a:r>
-              <a:rPr lang="en-US" altLang="zh-CN" sz="2400" dirty="0" err="1">
-                <a:solidFill>
-                  <a:srgbClr val="1F2328"/>
-                </a:solidFill>
-                <a:latin typeface="Calibri" panose="020F0502020204030204" pitchFamily="34" charset="0"/>
-                <a:ea typeface="Calibri" panose="020F0502020204030204" pitchFamily="34" charset="0"/>
-                <a:cs typeface="Calibri" panose="020F0502020204030204" pitchFamily="34" charset="0"/>
-              </a:rPr>
-              <a:t>maxlen</a:t>
-            </a:r>
-            <a:r>
-              <a:rPr lang="en-US" altLang="zh-CN" sz="2400" dirty="0">
-                <a:solidFill>
-                  <a:srgbClr val="1F2328"/>
-                </a:solidFill>
-                <a:latin typeface="Calibri" panose="020F0502020204030204" pitchFamily="34" charset="0"/>
-                <a:ea typeface="Calibri" panose="020F0502020204030204" pitchFamily="34" charset="0"/>
-                <a:cs typeface="Calibri" panose="020F0502020204030204" pitchFamily="34" charset="0"/>
-              </a:rPr>
-              <a:t>.</a:t>
+              <a:t>Incorporating these two time features could make the system perform better. </a:t>
             </a:r>
           </a:p>
         </p:txBody>
@@ -6492,7 +6294,7 @@
     </p:spTree>
     <p:extLst>
       <p:ext uri="{BB962C8B-B14F-4D97-AF65-F5344CB8AC3E}">
-        <p14:creationId xmlns:p14="http://schemas.microsoft.com/office/powerpoint/2010/main" val="3582111377"/>
+        <p14:creationId xmlns:p14="http://schemas.microsoft.com/office/powerpoint/2010/main" val="3722898602"/>
       </p:ext>
     </p:extLst>
   </p:cSld>
@@ -6643,8 +6445,8 @@
         </p:nvSpPr>
         <p:spPr>
           <a:xfrm>
-            <a:off x="241621" y="953724"/>
-            <a:ext cx="9967250" cy="2246769"/>
+            <a:off x="207442" y="969223"/>
+            <a:ext cx="9967250" cy="1384995"/>
           </a:xfrm>
           <a:prstGeom prst="rect">
             <a:avLst/>
@@ -6667,7 +6469,7 @@
                 <a:ea typeface="Calibri" panose="020F0502020204030204" pitchFamily="34" charset="0"/>
                 <a:cs typeface="Calibri" panose="020F0502020204030204" pitchFamily="34" charset="0"/>
               </a:rPr>
-              <a:t>1. Make the P90 coverage evaluation metric works as expected.</a:t>
+              <a:t>1. Make the relative timestamp work in all models.</a:t>
             </a:r>
           </a:p>
           <a:p>
@@ -6681,7 +6483,7 @@
                 <a:ea typeface="Calibri" panose="020F0502020204030204" pitchFamily="34" charset="0"/>
                 <a:cs typeface="Calibri" panose="020F0502020204030204" pitchFamily="34" charset="0"/>
               </a:rPr>
-              <a:t>2. Implement proposed models with the time features.</a:t>
+              <a:t>2. Complete the evaluation metric for P90 coverage.</a:t>
             </a:r>
           </a:p>
           <a:p>
@@ -6695,21 +6497,7 @@
                 <a:ea typeface="Calibri" panose="020F0502020204030204" pitchFamily="34" charset="0"/>
                 <a:cs typeface="Calibri" panose="020F0502020204030204" pitchFamily="34" charset="0"/>
               </a:rPr>
-              <a:t>3. Use other models’ generated item embeddings to convince my analysis.</a:t>
-            </a:r>
-          </a:p>
-          <a:p>
-            <a:pPr algn="l"/>
-            <a:r>
-              <a:rPr lang="en-US" altLang="zh-CN" sz="2800" dirty="0">
-                <a:solidFill>
-                  <a:srgbClr val="1F2328"/>
-                </a:solidFill>
-                <a:latin typeface="Calibri" panose="020F0502020204030204" pitchFamily="34" charset="0"/>
-                <a:ea typeface="Calibri" panose="020F0502020204030204" pitchFamily="34" charset="0"/>
-                <a:cs typeface="Calibri" panose="020F0502020204030204" pitchFamily="34" charset="0"/>
-              </a:rPr>
-              <a:t>4.</a:t>
+              <a:t>3.</a:t>
             </a:r>
             <a:r>
               <a:rPr lang="zh-CN" altLang="en-US" sz="2800" dirty="0">

</xml_diff>

<commit_message>
implement calculate the relative time features
</commit_message>
<xml_diff>
--- a/week7/Dissertation_7.pptx
+++ b/week7/Dissertation_7.pptx
@@ -204,7 +204,7 @@
           <a:p>
             <a:fld id="{5551B73A-00A5-41F0-AD1E-E8BC06CD57C4}" type="datetimeFigureOut">
               <a:rPr lang="zh-CN" altLang="en-US" smtClean="0"/>
-              <a:t>2023/7/17</a:t>
+              <a:t>2023/7/18</a:t>
             </a:fld>
             <a:endParaRPr lang="zh-CN" altLang="en-US"/>
           </a:p>
@@ -4319,7 +4319,7 @@
         <p:spPr>
           <a:xfrm>
             <a:off x="308781" y="2368228"/>
-            <a:ext cx="6096964" cy="3416320"/>
+            <a:ext cx="6867082" cy="3416320"/>
           </a:xfrm>
           <a:prstGeom prst="rect">
             <a:avLst/>
@@ -4421,10 +4421,13 @@
                 <a:ea typeface="Calibri" panose="020F0502020204030204" pitchFamily="34" charset="0"/>
                 <a:cs typeface="Calibri" panose="020F0502020204030204" pitchFamily="34" charset="0"/>
               </a:rPr>
-              <a:t>Problem</a:t>
-            </a:r>
-            <a:r>
-              <a:rPr lang="en-US" altLang="zh-CN" sz="1800">
+              <a:t>Problem: </a:t>
+            </a:r>
+          </a:p>
+          <a:p>
+            <a:pPr algn="l"/>
+            <a:r>
+              <a:rPr lang="en-US" altLang="zh-CN" sz="1800" dirty="0">
                 <a:solidFill>
                   <a:srgbClr val="1F2328"/>
                 </a:solidFill>
@@ -4432,32 +4435,7 @@
                 <a:ea typeface="Calibri" panose="020F0502020204030204" pitchFamily="34" charset="0"/>
                 <a:cs typeface="Calibri" panose="020F0502020204030204" pitchFamily="34" charset="0"/>
               </a:rPr>
-              <a:t>: </a:t>
-            </a:r>
-          </a:p>
-          <a:p>
-            <a:pPr algn="l"/>
-            <a:r>
-              <a:rPr lang="en-US" altLang="zh-CN" sz="1800">
-                <a:solidFill>
-                  <a:srgbClr val="1F2328"/>
-                </a:solidFill>
-                <a:latin typeface="Calibri" panose="020F0502020204030204" pitchFamily="34" charset="0"/>
-                <a:ea typeface="Calibri" panose="020F0502020204030204" pitchFamily="34" charset="0"/>
-                <a:cs typeface="Calibri" panose="020F0502020204030204" pitchFamily="34" charset="0"/>
-              </a:rPr>
-              <a:t>Memory </a:t>
-            </a:r>
-            <a:r>
-              <a:rPr lang="en-US" altLang="zh-CN" sz="1800" dirty="0">
-                <a:solidFill>
-                  <a:srgbClr val="1F2328"/>
-                </a:solidFill>
-                <a:latin typeface="Calibri" panose="020F0502020204030204" pitchFamily="34" charset="0"/>
-                <a:ea typeface="Calibri" panose="020F0502020204030204" pitchFamily="34" charset="0"/>
-                <a:cs typeface="Calibri" panose="020F0502020204030204" pitchFamily="34" charset="0"/>
-              </a:rPr>
-              <a:t>consuming</a:t>
+              <a:t>Memory consuming</a:t>
             </a:r>
           </a:p>
           <a:p>
@@ -4570,7 +4548,21 @@
                 <a:ea typeface="Calibri" panose="020F0502020204030204" pitchFamily="34" charset="0"/>
                 <a:cs typeface="Calibri" panose="020F0502020204030204" pitchFamily="34" charset="0"/>
               </a:rPr>
-              <a:t> before, but  this will cause memory error using time features. Currently </a:t>
+              <a:t> before, but  this will cause memory error using time features. </a:t>
+            </a:r>
+          </a:p>
+          <a:p>
+            <a:pPr algn="l"/>
+            <a:r>
+              <a:rPr lang="en-US" altLang="zh-CN" sz="1800" dirty="0">
+                <a:solidFill>
+                  <a:srgbClr val="1F2328"/>
+                </a:solidFill>
+                <a:latin typeface="Calibri" panose="020F0502020204030204" pitchFamily="34" charset="0"/>
+                <a:ea typeface="Calibri" panose="020F0502020204030204" pitchFamily="34" charset="0"/>
+                <a:cs typeface="Calibri" panose="020F0502020204030204" pitchFamily="34" charset="0"/>
+              </a:rPr>
+              <a:t>If incorporate time feature like this: </a:t>
             </a:r>
             <a:r>
               <a:rPr lang="en-US" altLang="zh-CN" sz="1800" dirty="0">
@@ -6446,7 +6438,7 @@
         <p:spPr>
           <a:xfrm>
             <a:off x="207442" y="969223"/>
-            <a:ext cx="9967250" cy="1384995"/>
+            <a:ext cx="9967250" cy="954107"/>
           </a:xfrm>
           <a:prstGeom prst="rect">
             <a:avLst/>
@@ -6469,7 +6461,7 @@
                 <a:ea typeface="Calibri" panose="020F0502020204030204" pitchFamily="34" charset="0"/>
                 <a:cs typeface="Calibri" panose="020F0502020204030204" pitchFamily="34" charset="0"/>
               </a:rPr>
-              <a:t>1. Make the relative timestamp work in all models.</a:t>
+              <a:t>1. Make the relative timestamp (time gap) work in all models.</a:t>
             </a:r>
           </a:p>
           <a:p>
@@ -6483,43 +6475,7 @@
                 <a:ea typeface="Calibri" panose="020F0502020204030204" pitchFamily="34" charset="0"/>
                 <a:cs typeface="Calibri" panose="020F0502020204030204" pitchFamily="34" charset="0"/>
               </a:rPr>
-              <a:t>2. Complete the evaluation metric for P90 coverage.</a:t>
-            </a:r>
-          </a:p>
-          <a:p>
-            <a:pPr algn="l"/>
-            <a:r>
-              <a:rPr lang="en-US" altLang="zh-CN" sz="2800" dirty="0">
-                <a:solidFill>
-                  <a:srgbClr val="1F2328"/>
-                </a:solidFill>
-                <a:latin typeface="Calibri" panose="020F0502020204030204" pitchFamily="34" charset="0"/>
-                <a:ea typeface="Calibri" panose="020F0502020204030204" pitchFamily="34" charset="0"/>
-                <a:cs typeface="Calibri" panose="020F0502020204030204" pitchFamily="34" charset="0"/>
-              </a:rPr>
-              <a:t>3.</a:t>
-            </a:r>
-            <a:r>
-              <a:rPr lang="zh-CN" altLang="en-US" sz="2800" dirty="0">
-                <a:solidFill>
-                  <a:srgbClr val="1F2328"/>
-                </a:solidFill>
-                <a:latin typeface="Calibri" panose="020F0502020204030204" pitchFamily="34" charset="0"/>
-                <a:ea typeface="Calibri" panose="020F0502020204030204" pitchFamily="34" charset="0"/>
-                <a:cs typeface="Calibri" panose="020F0502020204030204" pitchFamily="34" charset="0"/>
-              </a:rPr>
-              <a:t> </a:t>
-            </a:r>
-            <a:r>
-              <a:rPr lang="en-US" altLang="zh-CN" sz="2800" dirty="0">
-                <a:solidFill>
-                  <a:srgbClr val="1F2328"/>
-                </a:solidFill>
-                <a:latin typeface="Calibri" panose="020F0502020204030204" pitchFamily="34" charset="0"/>
-                <a:ea typeface="Calibri" panose="020F0502020204030204" pitchFamily="34" charset="0"/>
-                <a:cs typeface="Calibri" panose="020F0502020204030204" pitchFamily="34" charset="0"/>
-              </a:rPr>
-              <a:t>Writing Dissertation</a:t>
+              <a:t>2. Writing Dissertation</a:t>
             </a:r>
           </a:p>
         </p:txBody>

</xml_diff>